<commit_message>
Update The Little Green Web App.pptx
</commit_message>
<xml_diff>
--- a/The Little Green Web App.pptx
+++ b/The Little Green Web App.pptx
@@ -13,7 +13,6 @@
     <p:sldId id="261" r:id="rId7"/>
     <p:sldId id="262" r:id="rId8"/>
     <p:sldId id="263" r:id="rId9"/>
-    <p:sldId id="264" r:id="rId10"/>
   </p:sldIdLst>
   <p:sldSz cx="12192000" cy="6858000"/>
   <p:notesSz cx="6858000" cy="9144000"/>
@@ -112,7 +111,20 @@
       </a:defRPr>
     </a:lvl9pPr>
   </p:defaultTextStyle>
+  <p:extLst>
+    <p:ext uri="{EFAFB233-063F-42B5-8137-9DF3F51BA10A}">
+      <p15:sldGuideLst xmlns:p15="http://schemas.microsoft.com/office/powerpoint/2012/main"/>
+    </p:ext>
+  </p:extLst>
 </p:presentation>
+</file>
+
+<file path=ppt/revisionInfo.xml><?xml version="1.0" encoding="utf-8"?>
+<p1510:revInfo xmlns:a="http://schemas.openxmlformats.org/drawingml/2006/main" xmlns:r="http://schemas.openxmlformats.org/officeDocument/2006/relationships" xmlns:p1510="http://schemas.microsoft.com/office/powerpoint/2015/10/main">
+  <p1510:revLst>
+    <p1510:client id="{C23C61F7-7F9C-4DB0-9859-8FA9732CF44C}" v="5" dt="2019-12-01T15:53:23.710"/>
+  </p1510:revLst>
+</p1510:revInfo>
 </file>
 
 <file path=ppt/slideLayouts/slideLayout1.xml><?xml version="1.0" encoding="utf-8"?>
@@ -8466,9 +8478,24 @@
           <a:lstStyle/>
           <a:p>
             <a:r>
-              <a:rPr lang="en-GB" dirty="0"/>
-              <a:t>“#Insert link”</a:t>
-            </a:r>
+              <a:rPr lang="en-GB" dirty="0">
+                <a:hlinkClick r:id="rId2"/>
+              </a:rPr>
+              <a:t>“https://jweir211.github.io/</a:t>
+            </a:r>
+            <a:r>
+              <a:rPr lang="en-GB" dirty="0" err="1">
+                <a:hlinkClick r:id="rId2"/>
+              </a:rPr>
+              <a:t>LittleGreenWebApp</a:t>
+            </a:r>
+            <a:r>
+              <a:rPr lang="en-GB" dirty="0">
+                <a:hlinkClick r:id="rId2"/>
+              </a:rPr>
+              <a:t>”</a:t>
+            </a:r>
+            <a:endParaRPr lang="en-GB" dirty="0"/>
           </a:p>
         </p:txBody>
       </p:sp>
@@ -8571,100 +8598,6 @@
     <p:extLst>
       <p:ext uri="{BB962C8B-B14F-4D97-AF65-F5344CB8AC3E}">
         <p14:creationId xmlns:p14="http://schemas.microsoft.com/office/powerpoint/2010/main" val="510703510"/>
-      </p:ext>
-    </p:extLst>
-  </p:cSld>
-  <p:clrMapOvr>
-    <a:masterClrMapping/>
-  </p:clrMapOvr>
-</p:sld>
-</file>
-
-<file path=ppt/slides/slide9.xml><?xml version="1.0" encoding="utf-8"?>
-<p:sld xmlns:a="http://schemas.openxmlformats.org/drawingml/2006/main" xmlns:r="http://schemas.openxmlformats.org/officeDocument/2006/relationships" xmlns:p="http://schemas.openxmlformats.org/presentationml/2006/main">
-  <p:cSld>
-    <p:spTree>
-      <p:nvGrpSpPr>
-        <p:cNvPr id="1" name=""/>
-        <p:cNvGrpSpPr/>
-        <p:nvPr/>
-      </p:nvGrpSpPr>
-      <p:grpSpPr>
-        <a:xfrm>
-          <a:off x="0" y="0"/>
-          <a:ext cx="0" cy="0"/>
-          <a:chOff x="0" y="0"/>
-          <a:chExt cx="0" cy="0"/>
-        </a:xfrm>
-      </p:grpSpPr>
-      <p:sp>
-        <p:nvSpPr>
-          <p:cNvPr id="2" name="Title 1">
-            <a:extLst>
-              <a:ext uri="{FF2B5EF4-FFF2-40B4-BE49-F238E27FC236}">
-                <a16:creationId xmlns:a16="http://schemas.microsoft.com/office/drawing/2014/main" id="{103B2817-E3AE-4106-90FA-9D88E20C5725}"/>
-              </a:ext>
-            </a:extLst>
-          </p:cNvPr>
-          <p:cNvSpPr>
-            <a:spLocks noGrp="1"/>
-          </p:cNvSpPr>
-          <p:nvPr>
-            <p:ph type="title"/>
-          </p:nvPr>
-        </p:nvSpPr>
-        <p:spPr/>
-        <p:txBody>
-          <a:bodyPr/>
-          <a:lstStyle/>
-          <a:p>
-            <a:pPr algn="ctr"/>
-            <a:r>
-              <a:rPr lang="en-GB" dirty="0"/>
-              <a:t>That was All for this time,</a:t>
-            </a:r>
-            <a:br>
-              <a:rPr lang="en-GB" dirty="0"/>
-            </a:br>
-            <a:r>
-              <a:rPr lang="en-GB" dirty="0"/>
-              <a:t>Bye</a:t>
-            </a:r>
-          </a:p>
-        </p:txBody>
-      </p:sp>
-      <p:sp>
-        <p:nvSpPr>
-          <p:cNvPr id="3" name="Text Placeholder 2">
-            <a:extLst>
-              <a:ext uri="{FF2B5EF4-FFF2-40B4-BE49-F238E27FC236}">
-                <a16:creationId xmlns:a16="http://schemas.microsoft.com/office/drawing/2014/main" id="{3DD1DE13-4E60-43D0-8C72-A2F74952186B}"/>
-              </a:ext>
-            </a:extLst>
-          </p:cNvPr>
-          <p:cNvSpPr>
-            <a:spLocks noGrp="1"/>
-          </p:cNvSpPr>
-          <p:nvPr>
-            <p:ph type="body" sz="half" idx="2"/>
-          </p:nvPr>
-        </p:nvSpPr>
-        <p:spPr/>
-        <p:txBody>
-          <a:bodyPr/>
-          <a:lstStyle/>
-          <a:p>
-            <a:r>
-              <a:rPr lang="en-GB" dirty="0"/>
-              <a:t>Made by Jonas M. Olsson, John Harrow and Jack Weir</a:t>
-            </a:r>
-          </a:p>
-        </p:txBody>
-      </p:sp>
-    </p:spTree>
-    <p:extLst>
-      <p:ext uri="{BB962C8B-B14F-4D97-AF65-F5344CB8AC3E}">
-        <p14:creationId xmlns:p14="http://schemas.microsoft.com/office/powerpoint/2010/main" val="1696841466"/>
       </p:ext>
     </p:extLst>
   </p:cSld>

</xml_diff>